<commit_message>
more 2b figure fixup
</commit_message>
<xml_diff>
--- a/ITI/TF/Volume2/media/Figure_3.32.4-1.pptx
+++ b/ITI/TF/Volume2/media/Figure_3.32.4-1.pptx
@@ -104,6 +104,11 @@
       </a:defRPr>
     </a:lvl9pPr>
   </p:defaultTextStyle>
+  <p:extLst>
+    <p:ext uri="{EFAFB233-063F-42B5-8137-9DF3F51BA10A}">
+      <p15:sldGuideLst xmlns:p15="http://schemas.microsoft.com/office/powerpoint/2012/main"/>
+    </p:ext>
+  </p:extLst>
 </p:presentation>
 </file>
 
@@ -254,7 +259,7 @@
           <a:p>
             <a:fld id="{7F72D541-D565-654E-8FC4-6E18D8C497E4}" type="datetimeFigureOut">
               <a:rPr lang="en-US" smtClean="0"/>
-              <a:t>11/10/20</a:t>
+              <a:t>11/11/2020</a:t>
             </a:fld>
             <a:endParaRPr lang="en-US"/>
           </a:p>
@@ -452,7 +457,7 @@
           <a:p>
             <a:fld id="{7F72D541-D565-654E-8FC4-6E18D8C497E4}" type="datetimeFigureOut">
               <a:rPr lang="en-US" smtClean="0"/>
-              <a:t>11/10/20</a:t>
+              <a:t>11/11/2020</a:t>
             </a:fld>
             <a:endParaRPr lang="en-US"/>
           </a:p>
@@ -660,7 +665,7 @@
           <a:p>
             <a:fld id="{7F72D541-D565-654E-8FC4-6E18D8C497E4}" type="datetimeFigureOut">
               <a:rPr lang="en-US" smtClean="0"/>
-              <a:t>11/10/20</a:t>
+              <a:t>11/11/2020</a:t>
             </a:fld>
             <a:endParaRPr lang="en-US"/>
           </a:p>
@@ -858,7 +863,7 @@
           <a:p>
             <a:fld id="{7F72D541-D565-654E-8FC4-6E18D8C497E4}" type="datetimeFigureOut">
               <a:rPr lang="en-US" smtClean="0"/>
-              <a:t>11/10/20</a:t>
+              <a:t>11/11/2020</a:t>
             </a:fld>
             <a:endParaRPr lang="en-US"/>
           </a:p>
@@ -1133,7 +1138,7 @@
           <a:p>
             <a:fld id="{7F72D541-D565-654E-8FC4-6E18D8C497E4}" type="datetimeFigureOut">
               <a:rPr lang="en-US" smtClean="0"/>
-              <a:t>11/10/20</a:t>
+              <a:t>11/11/2020</a:t>
             </a:fld>
             <a:endParaRPr lang="en-US"/>
           </a:p>
@@ -1398,7 +1403,7 @@
           <a:p>
             <a:fld id="{7F72D541-D565-654E-8FC4-6E18D8C497E4}" type="datetimeFigureOut">
               <a:rPr lang="en-US" smtClean="0"/>
-              <a:t>11/10/20</a:t>
+              <a:t>11/11/2020</a:t>
             </a:fld>
             <a:endParaRPr lang="en-US"/>
           </a:p>
@@ -1810,7 +1815,7 @@
           <a:p>
             <a:fld id="{7F72D541-D565-654E-8FC4-6E18D8C497E4}" type="datetimeFigureOut">
               <a:rPr lang="en-US" smtClean="0"/>
-              <a:t>11/10/20</a:t>
+              <a:t>11/11/2020</a:t>
             </a:fld>
             <a:endParaRPr lang="en-US"/>
           </a:p>
@@ -1951,7 +1956,7 @@
           <a:p>
             <a:fld id="{7F72D541-D565-654E-8FC4-6E18D8C497E4}" type="datetimeFigureOut">
               <a:rPr lang="en-US" smtClean="0"/>
-              <a:t>11/10/20</a:t>
+              <a:t>11/11/2020</a:t>
             </a:fld>
             <a:endParaRPr lang="en-US"/>
           </a:p>
@@ -2064,7 +2069,7 @@
           <a:p>
             <a:fld id="{7F72D541-D565-654E-8FC4-6E18D8C497E4}" type="datetimeFigureOut">
               <a:rPr lang="en-US" smtClean="0"/>
-              <a:t>11/10/20</a:t>
+              <a:t>11/11/2020</a:t>
             </a:fld>
             <a:endParaRPr lang="en-US"/>
           </a:p>
@@ -2375,7 +2380,7 @@
           <a:p>
             <a:fld id="{7F72D541-D565-654E-8FC4-6E18D8C497E4}" type="datetimeFigureOut">
               <a:rPr lang="en-US" smtClean="0"/>
-              <a:t>11/10/20</a:t>
+              <a:t>11/11/2020</a:t>
             </a:fld>
             <a:endParaRPr lang="en-US"/>
           </a:p>
@@ -2663,7 +2668,7 @@
           <a:p>
             <a:fld id="{7F72D541-D565-654E-8FC4-6E18D8C497E4}" type="datetimeFigureOut">
               <a:rPr lang="en-US" smtClean="0"/>
-              <a:t>11/10/20</a:t>
+              <a:t>11/11/2020</a:t>
             </a:fld>
             <a:endParaRPr lang="en-US"/>
           </a:p>
@@ -2904,7 +2909,7 @@
           <a:p>
             <a:fld id="{7F72D541-D565-654E-8FC4-6E18D8C497E4}" type="datetimeFigureOut">
               <a:rPr lang="en-US" smtClean="0"/>
-              <a:t>11/10/20</a:t>
+              <a:t>11/11/2020</a:t>
             </a:fld>
             <a:endParaRPr lang="en-US"/>
           </a:p>
@@ -3392,10 +3397,10 @@
       </p:sp>
       <p:graphicFrame>
         <p:nvGraphicFramePr>
-          <p:cNvPr id="31" name="Object 30">
-            <a:extLst>
-              <a:ext uri="{FF2B5EF4-FFF2-40B4-BE49-F238E27FC236}">
-                <a16:creationId xmlns:a16="http://schemas.microsoft.com/office/drawing/2014/main" id="{8EC69FAB-D1EF-3349-A849-665C443A3C25}"/>
+          <p:cNvPr id="3" name="Object 2">
+            <a:extLst>
+              <a:ext uri="{FF2B5EF4-FFF2-40B4-BE49-F238E27FC236}">
+                <a16:creationId xmlns:a16="http://schemas.microsoft.com/office/drawing/2014/main" id="{F1EC3054-AD00-47EB-B322-F35F802E5FE3}"/>
               </a:ext>
             </a:extLst>
           </p:cNvPr>
@@ -3405,29 +3410,29 @@
           <p:nvPr>
             <p:extLst>
               <p:ext uri="{D42A27DB-BD31-4B8C-83A1-F6EECF244321}">
-                <p14:modId xmlns:p14="http://schemas.microsoft.com/office/powerpoint/2010/main" val="2086353175"/>
+                <p14:modId xmlns:p14="http://schemas.microsoft.com/office/powerpoint/2010/main" val="2879132589"/>
               </p:ext>
             </p:extLst>
           </p:nvPr>
         </p:nvGraphicFramePr>
         <p:xfrm>
-          <a:off x="4232952" y="2116476"/>
-          <a:ext cx="3060700" cy="1943100"/>
+          <a:off x="1087955" y="812805"/>
+          <a:ext cx="8186674" cy="5148852"/>
         </p:xfrm>
         <a:graphic>
           <a:graphicData uri="http://schemas.openxmlformats.org/presentationml/2006/ole">
             <mc:AlternateContent xmlns:mc="http://schemas.openxmlformats.org/markup-compatibility/2006">
               <mc:Choice xmlns:v="urn:schemas-microsoft-com:vml" Requires="v">
-                <p:oleObj spid="_x0000_s1041" name="Picture" r:id="rId3" imgW="3060700" imgH="1943100" progId="Word.Picture.8">
+                <p:oleObj spid="_x0000_s1044" name="Picture" r:id="rId3" imgW="3061716" imgH="1949196" progId="Word.Picture.8">
                   <p:embed/>
                 </p:oleObj>
               </mc:Choice>
               <mc:Fallback>
-                <p:oleObj name="Picture" r:id="rId3" imgW="3060700" imgH="1943100" progId="Word.Picture.8">
+                <p:oleObj name="Picture" r:id="rId3" imgW="3061716" imgH="1949196" progId="Word.Picture.8">
                   <p:embed/>
                   <p:pic>
                     <p:nvPicPr>
-                      <p:cNvPr id="0" name="Object 15"/>
+                      <p:cNvPr id="0" name="Object 18"/>
                       <p:cNvPicPr>
                         <a:picLocks noChangeAspect="1" noChangeArrowheads="1"/>
                       </p:cNvPicPr>
@@ -3448,22 +3453,13 @@
                     </p:blipFill>
                     <p:spPr bwMode="auto">
                       <a:xfrm>
-                        <a:off x="4232952" y="2116476"/>
-                        <a:ext cx="3060700" cy="1943100"/>
+                        <a:off x="1087955" y="812805"/>
+                        <a:ext cx="8186674" cy="5148852"/>
                       </a:xfrm>
                       <a:prstGeom prst="rect">
                         <a:avLst/>
                       </a:prstGeom>
                       <a:noFill/>
-                      <a:extLst>
-                        <a:ext uri="{909E8E84-426E-40DD-AFC4-6F175D3DCCD1}">
-                          <a14:hiddenFill xmlns:a14="http://schemas.microsoft.com/office/drawing/2010/main">
-                            <a:solidFill>
-                              <a:srgbClr val="FFFFFF"/>
-                            </a:solidFill>
-                          </a14:hiddenFill>
-                        </a:ext>
-                      </a:extLst>
                     </p:spPr>
                   </p:pic>
                 </p:oleObj>

</xml_diff>